<commit_message>
lots of small changes
</commit_message>
<xml_diff>
--- a/fido-wallet-whitepaper.pptx
+++ b/fido-wallet-whitepaper.pptx
@@ -7,8 +7,9 @@
   <p:sldIdLst>
     <p:sldId id="257" r:id="rId2"/>
     <p:sldId id="259" r:id="rId3"/>
-    <p:sldId id="260" r:id="rId4"/>
-    <p:sldId id="258" r:id="rId5"/>
+    <p:sldId id="261" r:id="rId4"/>
+    <p:sldId id="260" r:id="rId5"/>
+    <p:sldId id="258" r:id="rId6"/>
   </p:sldIdLst>
   <p:sldSz cx="12192000" cy="6858000"/>
   <p:notesSz cx="6858000" cy="9144000"/>
@@ -172,7 +173,7 @@
             </a:fld>
             <a:r>
               <a:rPr lang="en-US" sz="800" dirty="0"/>
-              <a:t>/4</a:t>
+              <a:t>/5</a:t>
             </a:r>
           </a:p>
         </p:txBody>
@@ -4326,6 +4327,872 @@
       </p:grpSpPr>
       <p:sp>
         <p:nvSpPr>
+          <p:cNvPr id="4" name="TextBox 3">
+            <a:extLst>
+              <a:ext uri="{FF2B5EF4-FFF2-40B4-BE49-F238E27FC236}">
+                <a16:creationId xmlns:a16="http://schemas.microsoft.com/office/drawing/2014/main" id="{E8061992-EA1A-B21C-F268-8EE3B525AF3E}"/>
+              </a:ext>
+            </a:extLst>
+          </p:cNvPr>
+          <p:cNvSpPr txBox="1"/>
+          <p:nvPr/>
+        </p:nvSpPr>
+        <p:spPr>
+          <a:xfrm>
+            <a:off x="3928585" y="90559"/>
+            <a:ext cx="4334841" cy="369332"/>
+          </a:xfrm>
+          <a:prstGeom prst="rect">
+            <a:avLst/>
+          </a:prstGeom>
+          <a:noFill/>
+        </p:spPr>
+        <p:txBody>
+          <a:bodyPr wrap="none" rtlCol="0">
+            <a:spAutoFit/>
+          </a:bodyPr>
+          <a:lstStyle/>
+          <a:p>
+            <a:pPr algn="ctr"/>
+            <a:r>
+              <a:rPr lang="en-US" dirty="0">
+                <a:latin typeface="Roboto Medium" panose="02000000000000000000" pitchFamily="2" charset="0"/>
+                <a:ea typeface="Roboto Medium" panose="02000000000000000000" pitchFamily="2" charset="0"/>
+              </a:rPr>
+              <a:t>Wallet – </a:t>
+            </a:r>
+            <a:r>
+              <a:rPr lang="en-US" i="1" dirty="0">
+                <a:latin typeface="Roboto Medium" panose="02000000000000000000" pitchFamily="2" charset="0"/>
+                <a:ea typeface="Roboto Medium" panose="02000000000000000000" pitchFamily="2" charset="0"/>
+              </a:rPr>
+              <a:t>Enhancement of EMV Card Data</a:t>
+            </a:r>
+          </a:p>
+        </p:txBody>
+      </p:sp>
+      <p:sp>
+        <p:nvSpPr>
+          <p:cNvPr id="8" name="TextBox 7">
+            <a:extLst>
+              <a:ext uri="{FF2B5EF4-FFF2-40B4-BE49-F238E27FC236}">
+                <a16:creationId xmlns:a16="http://schemas.microsoft.com/office/drawing/2014/main" id="{CC32CA91-BAA2-15C5-878B-8EAB2BFA8E32}"/>
+              </a:ext>
+            </a:extLst>
+          </p:cNvPr>
+          <p:cNvSpPr txBox="1"/>
+          <p:nvPr/>
+        </p:nvSpPr>
+        <p:spPr>
+          <a:xfrm>
+            <a:off x="3045823" y="833980"/>
+            <a:ext cx="2326213" cy="369332"/>
+          </a:xfrm>
+          <a:prstGeom prst="rect">
+            <a:avLst/>
+          </a:prstGeom>
+          <a:noFill/>
+        </p:spPr>
+        <p:txBody>
+          <a:bodyPr wrap="none" rtlCol="0">
+            <a:spAutoFit/>
+          </a:bodyPr>
+          <a:lstStyle/>
+          <a:p>
+            <a:pPr algn="r"/>
+            <a:r>
+              <a:rPr lang="en-US" dirty="0"/>
+              <a:t>EMV Account ID (PAN)</a:t>
+            </a:r>
+          </a:p>
+        </p:txBody>
+      </p:sp>
+      <p:sp>
+        <p:nvSpPr>
+          <p:cNvPr id="68" name="TextBox 67">
+            <a:extLst>
+              <a:ext uri="{FF2B5EF4-FFF2-40B4-BE49-F238E27FC236}">
+                <a16:creationId xmlns:a16="http://schemas.microsoft.com/office/drawing/2014/main" id="{688D4EFB-BC4A-DDC5-3827-4B334AD645E3}"/>
+              </a:ext>
+            </a:extLst>
+          </p:cNvPr>
+          <p:cNvSpPr txBox="1"/>
+          <p:nvPr/>
+        </p:nvSpPr>
+        <p:spPr>
+          <a:xfrm>
+            <a:off x="5370381" y="836323"/>
+            <a:ext cx="2210863" cy="369332"/>
+          </a:xfrm>
+          <a:prstGeom prst="rect">
+            <a:avLst/>
+          </a:prstGeom>
+          <a:solidFill>
+            <a:schemeClr val="accent5">
+              <a:lumMod val="20000"/>
+              <a:lumOff val="80000"/>
+              <a:alpha val="70000"/>
+            </a:schemeClr>
+          </a:solidFill>
+          <a:ln>
+            <a:solidFill>
+              <a:schemeClr val="bg1">
+                <a:lumMod val="75000"/>
+              </a:schemeClr>
+            </a:solidFill>
+          </a:ln>
+        </p:spPr>
+        <p:txBody>
+          <a:bodyPr wrap="none" rtlCol="0">
+            <a:spAutoFit/>
+          </a:bodyPr>
+          <a:lstStyle/>
+          <a:p>
+            <a:pPr algn="ctr"/>
+            <a:r>
+              <a:rPr lang="en-US" noProof="1">
+                <a:latin typeface="Consolas" panose="020B0609020204030204" pitchFamily="49" charset="0"/>
+                <a:cs typeface="Courier New" panose="02070309020205020404" pitchFamily="49" charset="0"/>
+              </a:rPr>
+              <a:t>nnnnnnnnnnnnnnnn</a:t>
+            </a:r>
+          </a:p>
+        </p:txBody>
+      </p:sp>
+      <p:sp>
+        <p:nvSpPr>
+          <p:cNvPr id="73" name="TextBox 72">
+            <a:extLst>
+              <a:ext uri="{FF2B5EF4-FFF2-40B4-BE49-F238E27FC236}">
+                <a16:creationId xmlns:a16="http://schemas.microsoft.com/office/drawing/2014/main" id="{6A929FA1-759C-93B0-A9C2-A5C7FA6799F3}"/>
+              </a:ext>
+            </a:extLst>
+          </p:cNvPr>
+          <p:cNvSpPr txBox="1"/>
+          <p:nvPr/>
+        </p:nvSpPr>
+        <p:spPr>
+          <a:xfrm>
+            <a:off x="3933657" y="1623061"/>
+            <a:ext cx="4235262" cy="369332"/>
+          </a:xfrm>
+          <a:prstGeom prst="rect">
+            <a:avLst/>
+          </a:prstGeom>
+          <a:noFill/>
+        </p:spPr>
+        <p:txBody>
+          <a:bodyPr wrap="none" rtlCol="0">
+            <a:spAutoFit/>
+          </a:bodyPr>
+          <a:lstStyle/>
+          <a:p>
+            <a:pPr algn="ctr"/>
+            <a:r>
+              <a:rPr lang="en-US" dirty="0"/>
+              <a:t>FIDO Web Pay “Decomposed” Counterpart </a:t>
+            </a:r>
+          </a:p>
+        </p:txBody>
+      </p:sp>
+      <p:grpSp>
+        <p:nvGrpSpPr>
+          <p:cNvPr id="3" name="Group 2">
+            <a:extLst>
+              <a:ext uri="{FF2B5EF4-FFF2-40B4-BE49-F238E27FC236}">
+                <a16:creationId xmlns:a16="http://schemas.microsoft.com/office/drawing/2014/main" id="{75D34477-10C3-1367-D3C3-E1733179EA47}"/>
+              </a:ext>
+            </a:extLst>
+          </p:cNvPr>
+          <p:cNvGrpSpPr/>
+          <p:nvPr/>
+        </p:nvGrpSpPr>
+        <p:grpSpPr>
+          <a:xfrm>
+            <a:off x="1222947" y="2536884"/>
+            <a:ext cx="3696537" cy="371675"/>
+            <a:chOff x="1602798" y="2497128"/>
+            <a:chExt cx="3696537" cy="371675"/>
+          </a:xfrm>
+        </p:grpSpPr>
+        <p:sp>
+          <p:nvSpPr>
+            <p:cNvPr id="74" name="TextBox 73">
+              <a:extLst>
+                <a:ext uri="{FF2B5EF4-FFF2-40B4-BE49-F238E27FC236}">
+                  <a16:creationId xmlns:a16="http://schemas.microsoft.com/office/drawing/2014/main" id="{79C9EE33-F184-905B-0A78-A090867373BE}"/>
+                </a:ext>
+              </a:extLst>
+            </p:cNvPr>
+            <p:cNvSpPr txBox="1"/>
+            <p:nvPr/>
+          </p:nvSpPr>
+          <p:spPr>
+            <a:xfrm>
+              <a:off x="1602798" y="2497128"/>
+              <a:ext cx="1204945" cy="369332"/>
+            </a:xfrm>
+            <a:prstGeom prst="rect">
+              <a:avLst/>
+            </a:prstGeom>
+            <a:noFill/>
+          </p:spPr>
+          <p:txBody>
+            <a:bodyPr wrap="none" rtlCol="0">
+              <a:spAutoFit/>
+            </a:bodyPr>
+            <a:lstStyle/>
+            <a:p>
+              <a:pPr algn="r"/>
+              <a:r>
+                <a:rPr lang="en-US" dirty="0"/>
+                <a:t>Account ID</a:t>
+              </a:r>
+            </a:p>
+          </p:txBody>
+        </p:sp>
+        <p:sp>
+          <p:nvSpPr>
+            <p:cNvPr id="75" name="TextBox 74">
+              <a:extLst>
+                <a:ext uri="{FF2B5EF4-FFF2-40B4-BE49-F238E27FC236}">
+                  <a16:creationId xmlns:a16="http://schemas.microsoft.com/office/drawing/2014/main" id="{71513512-89A7-EB24-EFD9-CC1F7F68FAF3}"/>
+                </a:ext>
+              </a:extLst>
+            </p:cNvPr>
+            <p:cNvSpPr txBox="1"/>
+            <p:nvPr/>
+          </p:nvSpPr>
+          <p:spPr>
+            <a:xfrm>
+              <a:off x="2831736" y="2499471"/>
+              <a:ext cx="2467599" cy="369332"/>
+            </a:xfrm>
+            <a:prstGeom prst="rect">
+              <a:avLst/>
+            </a:prstGeom>
+            <a:solidFill>
+              <a:srgbClr val="F6FAF4"/>
+            </a:solidFill>
+            <a:ln>
+              <a:solidFill>
+                <a:schemeClr val="bg1">
+                  <a:lumMod val="75000"/>
+                </a:schemeClr>
+              </a:solidFill>
+            </a:ln>
+          </p:spPr>
+          <p:txBody>
+            <a:bodyPr wrap="none" rtlCol="0">
+              <a:spAutoFit/>
+            </a:bodyPr>
+            <a:lstStyle/>
+            <a:p>
+              <a:r>
+                <a:rPr lang="en-US" noProof="1">
+                  <a:cs typeface="Courier New" panose="02070309020205020404" pitchFamily="49" charset="0"/>
+                </a:rPr>
+                <a:t>Account Identifier String</a:t>
+              </a:r>
+            </a:p>
+          </p:txBody>
+        </p:sp>
+      </p:grpSp>
+      <p:grpSp>
+        <p:nvGrpSpPr>
+          <p:cNvPr id="5" name="Group 4">
+            <a:extLst>
+              <a:ext uri="{FF2B5EF4-FFF2-40B4-BE49-F238E27FC236}">
+                <a16:creationId xmlns:a16="http://schemas.microsoft.com/office/drawing/2014/main" id="{ED6E3F4A-81AA-A0C2-ABAC-31BCC0E3E0D7}"/>
+              </a:ext>
+            </a:extLst>
+          </p:cNvPr>
+          <p:cNvGrpSpPr/>
+          <p:nvPr/>
+        </p:nvGrpSpPr>
+        <p:grpSpPr>
+          <a:xfrm>
+            <a:off x="597455" y="3782584"/>
+            <a:ext cx="4322029" cy="371675"/>
+            <a:chOff x="686906" y="3693136"/>
+            <a:chExt cx="4322029" cy="371675"/>
+          </a:xfrm>
+        </p:grpSpPr>
+        <p:sp>
+          <p:nvSpPr>
+            <p:cNvPr id="76" name="TextBox 75">
+              <a:extLst>
+                <a:ext uri="{FF2B5EF4-FFF2-40B4-BE49-F238E27FC236}">
+                  <a16:creationId xmlns:a16="http://schemas.microsoft.com/office/drawing/2014/main" id="{14543415-F08E-D9F9-6465-D79AE8EB47DB}"/>
+                </a:ext>
+              </a:extLst>
+            </p:cNvPr>
+            <p:cNvSpPr txBox="1"/>
+            <p:nvPr/>
+          </p:nvSpPr>
+          <p:spPr>
+            <a:xfrm>
+              <a:off x="686906" y="3693136"/>
+              <a:ext cx="2120837" cy="369332"/>
+            </a:xfrm>
+            <a:prstGeom prst="rect">
+              <a:avLst/>
+            </a:prstGeom>
+            <a:noFill/>
+          </p:spPr>
+          <p:txBody>
+            <a:bodyPr wrap="none" rtlCol="0">
+              <a:spAutoFit/>
+            </a:bodyPr>
+            <a:lstStyle/>
+            <a:p>
+              <a:pPr algn="r"/>
+              <a:r>
+                <a:rPr lang="en-US" dirty="0"/>
+                <a:t>Payment Network ID</a:t>
+              </a:r>
+            </a:p>
+          </p:txBody>
+        </p:sp>
+        <p:sp>
+          <p:nvSpPr>
+            <p:cNvPr id="77" name="TextBox 76">
+              <a:extLst>
+                <a:ext uri="{FF2B5EF4-FFF2-40B4-BE49-F238E27FC236}">
+                  <a16:creationId xmlns:a16="http://schemas.microsoft.com/office/drawing/2014/main" id="{9675B1F4-775F-E04C-FBEE-39CC896F00F0}"/>
+                </a:ext>
+              </a:extLst>
+            </p:cNvPr>
+            <p:cNvSpPr txBox="1"/>
+            <p:nvPr/>
+          </p:nvSpPr>
+          <p:spPr>
+            <a:xfrm>
+              <a:off x="2831736" y="3695479"/>
+              <a:ext cx="2177199" cy="369332"/>
+            </a:xfrm>
+            <a:prstGeom prst="rect">
+              <a:avLst/>
+            </a:prstGeom>
+            <a:solidFill>
+              <a:srgbClr val="F6FAF4"/>
+            </a:solidFill>
+            <a:ln>
+              <a:solidFill>
+                <a:schemeClr val="bg1">
+                  <a:lumMod val="75000"/>
+                </a:schemeClr>
+              </a:solidFill>
+            </a:ln>
+          </p:spPr>
+          <p:txBody>
+            <a:bodyPr wrap="none" rtlCol="0">
+              <a:spAutoFit/>
+            </a:bodyPr>
+            <a:lstStyle/>
+            <a:p>
+              <a:r>
+                <a:rPr lang="en-US" noProof="1">
+                  <a:cs typeface="Courier New" panose="02070309020205020404" pitchFamily="49" charset="0"/>
+                </a:rPr>
+                <a:t>URL or Specfic String</a:t>
+              </a:r>
+            </a:p>
+          </p:txBody>
+        </p:sp>
+      </p:grpSp>
+      <p:grpSp>
+        <p:nvGrpSpPr>
+          <p:cNvPr id="6" name="Group 5">
+            <a:extLst>
+              <a:ext uri="{FF2B5EF4-FFF2-40B4-BE49-F238E27FC236}">
+                <a16:creationId xmlns:a16="http://schemas.microsoft.com/office/drawing/2014/main" id="{C272F915-EA31-DE6A-0FF1-DAA3239B1C98}"/>
+              </a:ext>
+            </a:extLst>
+          </p:cNvPr>
+          <p:cNvGrpSpPr/>
+          <p:nvPr/>
+        </p:nvGrpSpPr>
+        <p:grpSpPr>
+          <a:xfrm>
+            <a:off x="2748429" y="4928894"/>
+            <a:ext cx="2171055" cy="371675"/>
+            <a:chOff x="1815164" y="4928894"/>
+            <a:chExt cx="2171055" cy="371675"/>
+          </a:xfrm>
+        </p:grpSpPr>
+        <p:sp>
+          <p:nvSpPr>
+            <p:cNvPr id="78" name="TextBox 77">
+              <a:extLst>
+                <a:ext uri="{FF2B5EF4-FFF2-40B4-BE49-F238E27FC236}">
+                  <a16:creationId xmlns:a16="http://schemas.microsoft.com/office/drawing/2014/main" id="{9061E2C2-9C66-6CCC-A043-84DF4FFCD913}"/>
+                </a:ext>
+              </a:extLst>
+            </p:cNvPr>
+            <p:cNvSpPr txBox="1"/>
+            <p:nvPr/>
+          </p:nvSpPr>
+          <p:spPr>
+            <a:xfrm>
+              <a:off x="1815164" y="4928894"/>
+              <a:ext cx="992579" cy="369332"/>
+            </a:xfrm>
+            <a:prstGeom prst="rect">
+              <a:avLst/>
+            </a:prstGeom>
+            <a:noFill/>
+          </p:spPr>
+          <p:txBody>
+            <a:bodyPr wrap="none" rtlCol="0">
+              <a:spAutoFit/>
+            </a:bodyPr>
+            <a:lstStyle/>
+            <a:p>
+              <a:pPr algn="r"/>
+              <a:r>
+                <a:rPr lang="en-US" dirty="0"/>
+                <a:t>Issuer ID</a:t>
+              </a:r>
+            </a:p>
+          </p:txBody>
+        </p:sp>
+        <p:sp>
+          <p:nvSpPr>
+            <p:cNvPr id="79" name="TextBox 78">
+              <a:extLst>
+                <a:ext uri="{FF2B5EF4-FFF2-40B4-BE49-F238E27FC236}">
+                  <a16:creationId xmlns:a16="http://schemas.microsoft.com/office/drawing/2014/main" id="{510ECAB9-2E36-3C32-1E28-9EAA999E0512}"/>
+                </a:ext>
+              </a:extLst>
+            </p:cNvPr>
+            <p:cNvSpPr txBox="1"/>
+            <p:nvPr/>
+          </p:nvSpPr>
+          <p:spPr>
+            <a:xfrm>
+              <a:off x="2831736" y="4931237"/>
+              <a:ext cx="1154483" cy="369332"/>
+            </a:xfrm>
+            <a:prstGeom prst="rect">
+              <a:avLst/>
+            </a:prstGeom>
+            <a:solidFill>
+              <a:srgbClr val="F6FAF4"/>
+            </a:solidFill>
+            <a:ln>
+              <a:solidFill>
+                <a:schemeClr val="bg1">
+                  <a:lumMod val="75000"/>
+                </a:schemeClr>
+              </a:solidFill>
+            </a:ln>
+          </p:spPr>
+          <p:txBody>
+            <a:bodyPr wrap="none" rtlCol="0">
+              <a:spAutoFit/>
+            </a:bodyPr>
+            <a:lstStyle/>
+            <a:p>
+              <a:r>
+                <a:rPr lang="en-US" noProof="1">
+                  <a:cs typeface="Courier New" panose="02070309020205020404" pitchFamily="49" charset="0"/>
+                </a:rPr>
+                <a:t>URL String</a:t>
+              </a:r>
+            </a:p>
+          </p:txBody>
+        </p:sp>
+      </p:grpSp>
+      <p:sp>
+        <p:nvSpPr>
+          <p:cNvPr id="83" name="TextBox 82">
+            <a:extLst>
+              <a:ext uri="{FF2B5EF4-FFF2-40B4-BE49-F238E27FC236}">
+                <a16:creationId xmlns:a16="http://schemas.microsoft.com/office/drawing/2014/main" id="{0803AA31-931D-51B8-76F4-83E7886BACD1}"/>
+              </a:ext>
+            </a:extLst>
+          </p:cNvPr>
+          <p:cNvSpPr txBox="1"/>
+          <p:nvPr/>
+        </p:nvSpPr>
+        <p:spPr>
+          <a:xfrm>
+            <a:off x="5169184" y="2245768"/>
+            <a:ext cx="6062033" cy="923330"/>
+          </a:xfrm>
+          <a:prstGeom prst="rect">
+            <a:avLst/>
+          </a:prstGeom>
+          <a:noFill/>
+        </p:spPr>
+        <p:txBody>
+          <a:bodyPr wrap="square" rtlCol="0">
+            <a:spAutoFit/>
+          </a:bodyPr>
+          <a:lstStyle/>
+          <a:p>
+            <a:r>
+              <a:rPr lang="en-US" dirty="0"/>
+              <a:t>Payment network compatible account identifier.</a:t>
+            </a:r>
+            <a:br>
+              <a:rPr lang="en-US" dirty="0"/>
+            </a:br>
+            <a:r>
+              <a:rPr lang="en-US" dirty="0"/>
+              <a:t>Examples: </a:t>
+            </a:r>
+            <a:r>
+              <a:rPr lang="en-US" dirty="0">
+                <a:latin typeface="Consolas" panose="020B0609020204030204" pitchFamily="49" charset="0"/>
+              </a:rPr>
+              <a:t>FR7630004003200001019471656</a:t>
+            </a:r>
+            <a:r>
+              <a:rPr lang="en-US" dirty="0"/>
+              <a:t> for a French IBAN and </a:t>
+            </a:r>
+            <a:r>
+              <a:rPr lang="en-US" dirty="0">
+                <a:latin typeface="Consolas" panose="020B0609020204030204" pitchFamily="49" charset="0"/>
+              </a:rPr>
+              <a:t>4111111111111111</a:t>
+            </a:r>
+            <a:r>
+              <a:rPr lang="en-US" dirty="0"/>
+              <a:t> for a VISA card.</a:t>
+            </a:r>
+          </a:p>
+        </p:txBody>
+      </p:sp>
+      <p:sp>
+        <p:nvSpPr>
+          <p:cNvPr id="84" name="TextBox 83">
+            <a:extLst>
+              <a:ext uri="{FF2B5EF4-FFF2-40B4-BE49-F238E27FC236}">
+                <a16:creationId xmlns:a16="http://schemas.microsoft.com/office/drawing/2014/main" id="{26F0AE1E-767F-3DD9-4EB0-0C228135B769}"/>
+              </a:ext>
+            </a:extLst>
+          </p:cNvPr>
+          <p:cNvSpPr txBox="1"/>
+          <p:nvPr/>
+        </p:nvSpPr>
+        <p:spPr>
+          <a:xfrm>
+            <a:off x="5169184" y="4795951"/>
+            <a:ext cx="6558990" cy="646331"/>
+          </a:xfrm>
+          <a:prstGeom prst="rect">
+            <a:avLst/>
+          </a:prstGeom>
+          <a:noFill/>
+        </p:spPr>
+        <p:txBody>
+          <a:bodyPr wrap="square" rtlCol="0">
+            <a:spAutoFit/>
+          </a:bodyPr>
+          <a:lstStyle/>
+          <a:p>
+            <a:r>
+              <a:rPr lang="en-US" dirty="0"/>
+              <a:t>URL to an issuer endpoint like: </a:t>
+            </a:r>
+            <a:r>
+              <a:rPr lang="en-US" dirty="0">
+                <a:latin typeface="Consolas" panose="020B0609020204030204" pitchFamily="49" charset="0"/>
+              </a:rPr>
+              <a:t>https://mybank.fr/payment</a:t>
+            </a:r>
+            <a:r>
+              <a:rPr lang="en-US" dirty="0"/>
+              <a:t>.</a:t>
+            </a:r>
+          </a:p>
+          <a:p>
+            <a:r>
+              <a:rPr lang="en-US" dirty="0"/>
+              <a:t>This solution eliminates Account ID to issuer URL lookup databases.</a:t>
+            </a:r>
+          </a:p>
+        </p:txBody>
+      </p:sp>
+      <p:sp>
+        <p:nvSpPr>
+          <p:cNvPr id="7" name="TextBox 6">
+            <a:extLst>
+              <a:ext uri="{FF2B5EF4-FFF2-40B4-BE49-F238E27FC236}">
+                <a16:creationId xmlns:a16="http://schemas.microsoft.com/office/drawing/2014/main" id="{F19064BF-17D4-B507-618E-121A14464429}"/>
+              </a:ext>
+            </a:extLst>
+          </p:cNvPr>
+          <p:cNvSpPr txBox="1"/>
+          <p:nvPr/>
+        </p:nvSpPr>
+        <p:spPr>
+          <a:xfrm>
+            <a:off x="5169184" y="3520860"/>
+            <a:ext cx="6337016" cy="923330"/>
+          </a:xfrm>
+          <a:prstGeom prst="rect">
+            <a:avLst/>
+          </a:prstGeom>
+          <a:noFill/>
+        </p:spPr>
+        <p:txBody>
+          <a:bodyPr wrap="square" rtlCol="0">
+            <a:spAutoFit/>
+          </a:bodyPr>
+          <a:lstStyle/>
+          <a:p>
+            <a:r>
+              <a:rPr lang="en-US" dirty="0"/>
+              <a:t>Payment network identifier.</a:t>
+            </a:r>
+            <a:br>
+              <a:rPr lang="en-US" dirty="0"/>
+            </a:br>
+            <a:r>
+              <a:rPr lang="en-US" dirty="0"/>
+              <a:t>Examples: </a:t>
+            </a:r>
+            <a:r>
+              <a:rPr lang="en-US" dirty="0">
+                <a:latin typeface="Consolas" panose="020B0609020204030204" pitchFamily="49" charset="0"/>
+              </a:rPr>
+              <a:t>https://banknet2.org</a:t>
+            </a:r>
+            <a:r>
+              <a:rPr lang="en-US" dirty="0"/>
+              <a:t> for a bank network and </a:t>
+            </a:r>
+            <a:r>
+              <a:rPr lang="en-US" dirty="0">
+                <a:latin typeface="Consolas" panose="020B0609020204030204" pitchFamily="49" charset="0"/>
+              </a:rPr>
+              <a:t>visa</a:t>
+            </a:r>
+            <a:r>
+              <a:rPr lang="en-US" dirty="0"/>
+              <a:t> for the VISA network.</a:t>
+            </a:r>
+          </a:p>
+        </p:txBody>
+      </p:sp>
+      <p:sp>
+        <p:nvSpPr>
+          <p:cNvPr id="9" name="TextBox 8">
+            <a:extLst>
+              <a:ext uri="{FF2B5EF4-FFF2-40B4-BE49-F238E27FC236}">
+                <a16:creationId xmlns:a16="http://schemas.microsoft.com/office/drawing/2014/main" id="{6A232355-7E2A-015B-24A9-67280B5A7222}"/>
+              </a:ext>
+            </a:extLst>
+          </p:cNvPr>
+          <p:cNvSpPr txBox="1"/>
+          <p:nvPr/>
+        </p:nvSpPr>
+        <p:spPr>
+          <a:xfrm>
+            <a:off x="872292" y="5837657"/>
+            <a:ext cx="10713420" cy="646331"/>
+          </a:xfrm>
+          <a:prstGeom prst="rect">
+            <a:avLst/>
+          </a:prstGeom>
+          <a:noFill/>
+        </p:spPr>
+        <p:txBody>
+          <a:bodyPr wrap="square" rtlCol="0">
+            <a:spAutoFit/>
+          </a:bodyPr>
+          <a:lstStyle/>
+          <a:p>
+            <a:r>
+              <a:rPr lang="en-US" dirty="0"/>
+              <a:t>That is, the only thing that separates card authorizations from authorizations of account-to-account payments are the variables above.  However, from the users’ perspective, only card images differ.</a:t>
+            </a:r>
+          </a:p>
+        </p:txBody>
+      </p:sp>
+      <p:sp>
+        <p:nvSpPr>
+          <p:cNvPr id="10" name="Rectangle 9">
+            <a:extLst>
+              <a:ext uri="{FF2B5EF4-FFF2-40B4-BE49-F238E27FC236}">
+                <a16:creationId xmlns:a16="http://schemas.microsoft.com/office/drawing/2014/main" id="{DCCD7186-C6E2-3461-0C05-BA47BC1C6F91}"/>
+              </a:ext>
+            </a:extLst>
+          </p:cNvPr>
+          <p:cNvSpPr/>
+          <p:nvPr/>
+        </p:nvSpPr>
+        <p:spPr>
+          <a:xfrm>
+            <a:off x="477077" y="2126974"/>
+            <a:ext cx="11246675" cy="3478696"/>
+          </a:xfrm>
+          <a:prstGeom prst="rect">
+            <a:avLst/>
+          </a:prstGeom>
+          <a:noFill/>
+          <a:ln>
+            <a:solidFill>
+              <a:schemeClr val="tx1">
+                <a:lumMod val="85000"/>
+                <a:lumOff val="15000"/>
+              </a:schemeClr>
+            </a:solidFill>
+          </a:ln>
+        </p:spPr>
+        <p:style>
+          <a:lnRef idx="2">
+            <a:schemeClr val="accent1">
+              <a:shade val="50000"/>
+            </a:schemeClr>
+          </a:lnRef>
+          <a:fillRef idx="1">
+            <a:schemeClr val="accent1"/>
+          </a:fillRef>
+          <a:effectRef idx="0">
+            <a:schemeClr val="accent1"/>
+          </a:effectRef>
+          <a:fontRef idx="minor">
+            <a:schemeClr val="lt1"/>
+          </a:fontRef>
+        </p:style>
+        <p:txBody>
+          <a:bodyPr rtlCol="0" anchor="ctr"/>
+          <a:lstStyle/>
+          <a:p>
+            <a:pPr algn="ctr"/>
+            <a:endParaRPr lang="en-US"/>
+          </a:p>
+        </p:txBody>
+      </p:sp>
+      <p:cxnSp>
+        <p:nvCxnSpPr>
+          <p:cNvPr id="12" name="Straight Connector 11">
+            <a:extLst>
+              <a:ext uri="{FF2B5EF4-FFF2-40B4-BE49-F238E27FC236}">
+                <a16:creationId xmlns:a16="http://schemas.microsoft.com/office/drawing/2014/main" id="{1729C7D7-02B2-7223-2945-B08377B3451A}"/>
+              </a:ext>
+            </a:extLst>
+          </p:cNvPr>
+          <p:cNvCxnSpPr>
+            <a:cxnSpLocks/>
+          </p:cNvCxnSpPr>
+          <p:nvPr/>
+        </p:nvCxnSpPr>
+        <p:spPr>
+          <a:xfrm>
+            <a:off x="477077" y="3329609"/>
+            <a:ext cx="11246675" cy="0"/>
+          </a:xfrm>
+          <a:prstGeom prst="line">
+            <a:avLst/>
+          </a:prstGeom>
+          <a:ln w="12700">
+            <a:solidFill>
+              <a:schemeClr val="tx1">
+                <a:lumMod val="65000"/>
+                <a:lumOff val="35000"/>
+              </a:schemeClr>
+            </a:solidFill>
+          </a:ln>
+        </p:spPr>
+        <p:style>
+          <a:lnRef idx="1">
+            <a:schemeClr val="accent1"/>
+          </a:lnRef>
+          <a:fillRef idx="0">
+            <a:schemeClr val="accent1"/>
+          </a:fillRef>
+          <a:effectRef idx="0">
+            <a:schemeClr val="accent1"/>
+          </a:effectRef>
+          <a:fontRef idx="minor">
+            <a:schemeClr val="tx1"/>
+          </a:fontRef>
+        </p:style>
+      </p:cxnSp>
+      <p:cxnSp>
+        <p:nvCxnSpPr>
+          <p:cNvPr id="14" name="Straight Connector 13">
+            <a:extLst>
+              <a:ext uri="{FF2B5EF4-FFF2-40B4-BE49-F238E27FC236}">
+                <a16:creationId xmlns:a16="http://schemas.microsoft.com/office/drawing/2014/main" id="{278F4E50-4DBA-19DC-9FCF-38999050728F}"/>
+              </a:ext>
+            </a:extLst>
+          </p:cNvPr>
+          <p:cNvCxnSpPr>
+            <a:cxnSpLocks/>
+          </p:cNvCxnSpPr>
+          <p:nvPr/>
+        </p:nvCxnSpPr>
+        <p:spPr>
+          <a:xfrm>
+            <a:off x="477077" y="4591879"/>
+            <a:ext cx="11246675" cy="0"/>
+          </a:xfrm>
+          <a:prstGeom prst="line">
+            <a:avLst/>
+          </a:prstGeom>
+          <a:ln w="12700">
+            <a:solidFill>
+              <a:schemeClr val="tx1">
+                <a:lumMod val="75000"/>
+                <a:lumOff val="25000"/>
+              </a:schemeClr>
+            </a:solidFill>
+          </a:ln>
+        </p:spPr>
+        <p:style>
+          <a:lnRef idx="1">
+            <a:schemeClr val="accent1"/>
+          </a:lnRef>
+          <a:fillRef idx="0">
+            <a:schemeClr val="accent1"/>
+          </a:fillRef>
+          <a:effectRef idx="0">
+            <a:schemeClr val="accent1"/>
+          </a:effectRef>
+          <a:fontRef idx="minor">
+            <a:schemeClr val="tx1"/>
+          </a:fontRef>
+        </p:style>
+      </p:cxnSp>
+    </p:spTree>
+    <p:extLst>
+      <p:ext uri="{BB962C8B-B14F-4D97-AF65-F5344CB8AC3E}">
+        <p14:creationId xmlns:p14="http://schemas.microsoft.com/office/powerpoint/2010/main" val="1371936627"/>
+      </p:ext>
+    </p:extLst>
+  </p:cSld>
+  <p:clrMapOvr>
+    <a:masterClrMapping/>
+  </p:clrMapOvr>
+</p:sld>
+</file>
+
+<file path=ppt/slides/slide4.xml><?xml version="1.0" encoding="utf-8"?>
+<p:sld xmlns:a="http://schemas.openxmlformats.org/drawingml/2006/main" xmlns:r="http://schemas.openxmlformats.org/officeDocument/2006/relationships" xmlns:p="http://schemas.openxmlformats.org/presentationml/2006/main">
+  <p:cSld>
+    <p:spTree>
+      <p:nvGrpSpPr>
+        <p:cNvPr id="1" name=""/>
+        <p:cNvGrpSpPr/>
+        <p:nvPr/>
+      </p:nvGrpSpPr>
+      <p:grpSpPr>
+        <a:xfrm>
+          <a:off x="0" y="0"/>
+          <a:ext cx="0" cy="0"/>
+          <a:chOff x="0" y="0"/>
+          <a:chExt cx="0" cy="0"/>
+        </a:xfrm>
+      </p:grpSpPr>
+      <p:sp>
+        <p:nvSpPr>
           <p:cNvPr id="14" name="Rectangle 13">
             <a:extLst>
               <a:ext uri="{FF2B5EF4-FFF2-40B4-BE49-F238E27FC236}">
@@ -7075,7 +7942,7 @@
 </p:sld>
 </file>
 
-<file path=ppt/slides/slide4.xml><?xml version="1.0" encoding="utf-8"?>
+<file path=ppt/slides/slide5.xml><?xml version="1.0" encoding="utf-8"?>
 <p:sld xmlns:a="http://schemas.openxmlformats.org/drawingml/2006/main" xmlns:r="http://schemas.openxmlformats.org/officeDocument/2006/relationships" xmlns:p="http://schemas.openxmlformats.org/presentationml/2006/main">
   <p:cSld>
     <p:spTree>

</xml_diff>

<commit_message>
Coloring custom data elements for visibility :)
</commit_message>
<xml_diff>
--- a/fido-wallet-whitepaper.pptx
+++ b/fido-wallet-whitepaper.pptx
@@ -446,7 +446,7 @@
           <a:p>
             <a:fld id="{FAE6055B-ABBD-4C0D-84D8-CCE0D097BF9D}" type="datetimeFigureOut">
               <a:rPr lang="en-US" smtClean="0"/>
-              <a:t>2022-11-16</a:t>
+              <a:t>2022-11-18</a:t>
             </a:fld>
             <a:endParaRPr lang="en-US"/>
           </a:p>
@@ -654,7 +654,7 @@
           <a:p>
             <a:fld id="{FAE6055B-ABBD-4C0D-84D8-CCE0D097BF9D}" type="datetimeFigureOut">
               <a:rPr lang="en-US" smtClean="0"/>
-              <a:t>2022-11-16</a:t>
+              <a:t>2022-11-18</a:t>
             </a:fld>
             <a:endParaRPr lang="en-US"/>
           </a:p>
@@ -852,7 +852,7 @@
           <a:p>
             <a:fld id="{FAE6055B-ABBD-4C0D-84D8-CCE0D097BF9D}" type="datetimeFigureOut">
               <a:rPr lang="en-US" smtClean="0"/>
-              <a:t>2022-11-16</a:t>
+              <a:t>2022-11-18</a:t>
             </a:fld>
             <a:endParaRPr lang="en-US"/>
           </a:p>
@@ -1127,7 +1127,7 @@
           <a:p>
             <a:fld id="{FAE6055B-ABBD-4C0D-84D8-CCE0D097BF9D}" type="datetimeFigureOut">
               <a:rPr lang="en-US" smtClean="0"/>
-              <a:t>2022-11-16</a:t>
+              <a:t>2022-11-18</a:t>
             </a:fld>
             <a:endParaRPr lang="en-US"/>
           </a:p>
@@ -1392,7 +1392,7 @@
           <a:p>
             <a:fld id="{FAE6055B-ABBD-4C0D-84D8-CCE0D097BF9D}" type="datetimeFigureOut">
               <a:rPr lang="en-US" smtClean="0"/>
-              <a:t>2022-11-16</a:t>
+              <a:t>2022-11-18</a:t>
             </a:fld>
             <a:endParaRPr lang="en-US"/>
           </a:p>
@@ -1804,7 +1804,7 @@
           <a:p>
             <a:fld id="{FAE6055B-ABBD-4C0D-84D8-CCE0D097BF9D}" type="datetimeFigureOut">
               <a:rPr lang="en-US" smtClean="0"/>
-              <a:t>2022-11-16</a:t>
+              <a:t>2022-11-18</a:t>
             </a:fld>
             <a:endParaRPr lang="en-US"/>
           </a:p>
@@ -1945,7 +1945,7 @@
           <a:p>
             <a:fld id="{FAE6055B-ABBD-4C0D-84D8-CCE0D097BF9D}" type="datetimeFigureOut">
               <a:rPr lang="en-US" smtClean="0"/>
-              <a:t>2022-11-16</a:t>
+              <a:t>2022-11-18</a:t>
             </a:fld>
             <a:endParaRPr lang="en-US"/>
           </a:p>
@@ -2058,7 +2058,7 @@
           <a:p>
             <a:fld id="{FAE6055B-ABBD-4C0D-84D8-CCE0D097BF9D}" type="datetimeFigureOut">
               <a:rPr lang="en-US" smtClean="0"/>
-              <a:t>2022-11-16</a:t>
+              <a:t>2022-11-18</a:t>
             </a:fld>
             <a:endParaRPr lang="en-US"/>
           </a:p>
@@ -2369,7 +2369,7 @@
           <a:p>
             <a:fld id="{FAE6055B-ABBD-4C0D-84D8-CCE0D097BF9D}" type="datetimeFigureOut">
               <a:rPr lang="en-US" smtClean="0"/>
-              <a:t>2022-11-16</a:t>
+              <a:t>2022-11-18</a:t>
             </a:fld>
             <a:endParaRPr lang="en-US"/>
           </a:p>
@@ -2657,7 +2657,7 @@
           <a:p>
             <a:fld id="{FAE6055B-ABBD-4C0D-84D8-CCE0D097BF9D}" type="datetimeFigureOut">
               <a:rPr lang="en-US" smtClean="0"/>
-              <a:t>2022-11-16</a:t>
+              <a:t>2022-11-18</a:t>
             </a:fld>
             <a:endParaRPr lang="en-US"/>
           </a:p>
@@ -2898,7 +2898,7 @@
           <a:p>
             <a:fld id="{FAE6055B-ABBD-4C0D-84D8-CCE0D097BF9D}" type="datetimeFigureOut">
               <a:rPr lang="en-US" smtClean="0"/>
-              <a:t>2022-11-16</a:t>
+              <a:t>2022-11-18</a:t>
             </a:fld>
             <a:endParaRPr lang="en-US"/>
           </a:p>
@@ -4428,11 +4428,9 @@
             <a:avLst/>
           </a:prstGeom>
           <a:solidFill>
-            <a:schemeClr val="accent5">
-              <a:lumMod val="20000"/>
-              <a:lumOff val="80000"/>
+            <a:srgbClr val="F6FAF4">
               <a:alpha val="70000"/>
-            </a:schemeClr>
+            </a:srgbClr>
           </a:solidFill>
           <a:ln>
             <a:solidFill>
@@ -4845,6 +4843,11 @@
             </a:r>
             <a:r>
               <a:rPr lang="en-US" dirty="0">
+                <a:solidFill>
+                  <a:schemeClr val="accent4">
+                    <a:lumMod val="50000"/>
+                  </a:schemeClr>
+                </a:solidFill>
                 <a:latin typeface="Consolas" panose="020B0609020204030204" pitchFamily="49" charset="0"/>
               </a:rPr>
               <a:t>FR7630004003200001019471656</a:t>
@@ -4855,6 +4858,11 @@
             </a:r>
             <a:r>
               <a:rPr lang="en-US" dirty="0">
+                <a:solidFill>
+                  <a:schemeClr val="accent4">
+                    <a:lumMod val="50000"/>
+                  </a:schemeClr>
+                </a:solidFill>
                 <a:latin typeface="Consolas" panose="020B0609020204030204" pitchFamily="49" charset="0"/>
               </a:rPr>
               <a:t>4111111111111111</a:t>
@@ -4900,6 +4908,11 @@
             </a:r>
             <a:r>
               <a:rPr lang="en-US" dirty="0">
+                <a:solidFill>
+                  <a:schemeClr val="accent4">
+                    <a:lumMod val="50000"/>
+                  </a:schemeClr>
+                </a:solidFill>
                 <a:latin typeface="Consolas" panose="020B0609020204030204" pitchFamily="49" charset="0"/>
               </a:rPr>
               <a:t>https://mybank.fr/payment</a:t>
@@ -4958,16 +4971,36 @@
             </a:r>
             <a:r>
               <a:rPr lang="en-US" dirty="0">
+                <a:solidFill>
+                  <a:schemeClr val="accent4">
+                    <a:lumMod val="50000"/>
+                  </a:schemeClr>
+                </a:solidFill>
                 <a:latin typeface="Consolas" panose="020B0609020204030204" pitchFamily="49" charset="0"/>
               </a:rPr>
               <a:t>https://banknet2.org</a:t>
             </a:r>
             <a:r>
+              <a:rPr lang="en-US" dirty="0">
+                <a:solidFill>
+                  <a:schemeClr val="accent4">
+                    <a:lumMod val="50000"/>
+                  </a:schemeClr>
+                </a:solidFill>
+              </a:rPr>
+              <a:t> </a:t>
+            </a:r>
+            <a:r>
               <a:rPr lang="en-US" dirty="0"/>
-              <a:t> for a bank network and </a:t>
+              <a:t>for a hypothetical bank network and </a:t>
             </a:r>
             <a:r>
               <a:rPr lang="en-US" dirty="0">
+                <a:solidFill>
+                  <a:schemeClr val="accent4">
+                    <a:lumMod val="50000"/>
+                  </a:schemeClr>
+                </a:solidFill>
                 <a:latin typeface="Consolas" panose="020B0609020204030204" pitchFamily="49" charset="0"/>
               </a:rPr>
               <a:t>visa</a:t>

</xml_diff>

<commit_message>
COTX added to ESAD
</commit_message>
<xml_diff>
--- a/fido-wallet-whitepaper.pptx
+++ b/fido-wallet-whitepaper.pptx
@@ -446,7 +446,7 @@
           <a:p>
             <a:fld id="{FAE6055B-ABBD-4C0D-84D8-CCE0D097BF9D}" type="datetimeFigureOut">
               <a:rPr lang="en-US" smtClean="0"/>
-              <a:t>2022-11-24</a:t>
+              <a:t>2023-01-08</a:t>
             </a:fld>
             <a:endParaRPr lang="en-US"/>
           </a:p>
@@ -654,7 +654,7 @@
           <a:p>
             <a:fld id="{FAE6055B-ABBD-4C0D-84D8-CCE0D097BF9D}" type="datetimeFigureOut">
               <a:rPr lang="en-US" smtClean="0"/>
-              <a:t>2022-11-24</a:t>
+              <a:t>2023-01-08</a:t>
             </a:fld>
             <a:endParaRPr lang="en-US"/>
           </a:p>
@@ -852,7 +852,7 @@
           <a:p>
             <a:fld id="{FAE6055B-ABBD-4C0D-84D8-CCE0D097BF9D}" type="datetimeFigureOut">
               <a:rPr lang="en-US" smtClean="0"/>
-              <a:t>2022-11-24</a:t>
+              <a:t>2023-01-08</a:t>
             </a:fld>
             <a:endParaRPr lang="en-US"/>
           </a:p>
@@ -1127,7 +1127,7 @@
           <a:p>
             <a:fld id="{FAE6055B-ABBD-4C0D-84D8-CCE0D097BF9D}" type="datetimeFigureOut">
               <a:rPr lang="en-US" smtClean="0"/>
-              <a:t>2022-11-24</a:t>
+              <a:t>2023-01-08</a:t>
             </a:fld>
             <a:endParaRPr lang="en-US"/>
           </a:p>
@@ -1392,7 +1392,7 @@
           <a:p>
             <a:fld id="{FAE6055B-ABBD-4C0D-84D8-CCE0D097BF9D}" type="datetimeFigureOut">
               <a:rPr lang="en-US" smtClean="0"/>
-              <a:t>2022-11-24</a:t>
+              <a:t>2023-01-08</a:t>
             </a:fld>
             <a:endParaRPr lang="en-US"/>
           </a:p>
@@ -1804,7 +1804,7 @@
           <a:p>
             <a:fld id="{FAE6055B-ABBD-4C0D-84D8-CCE0D097BF9D}" type="datetimeFigureOut">
               <a:rPr lang="en-US" smtClean="0"/>
-              <a:t>2022-11-24</a:t>
+              <a:t>2023-01-08</a:t>
             </a:fld>
             <a:endParaRPr lang="en-US"/>
           </a:p>
@@ -1945,7 +1945,7 @@
           <a:p>
             <a:fld id="{FAE6055B-ABBD-4C0D-84D8-CCE0D097BF9D}" type="datetimeFigureOut">
               <a:rPr lang="en-US" smtClean="0"/>
-              <a:t>2022-11-24</a:t>
+              <a:t>2023-01-08</a:t>
             </a:fld>
             <a:endParaRPr lang="en-US"/>
           </a:p>
@@ -2058,7 +2058,7 @@
           <a:p>
             <a:fld id="{FAE6055B-ABBD-4C0D-84D8-CCE0D097BF9D}" type="datetimeFigureOut">
               <a:rPr lang="en-US" smtClean="0"/>
-              <a:t>2022-11-24</a:t>
+              <a:t>2023-01-08</a:t>
             </a:fld>
             <a:endParaRPr lang="en-US"/>
           </a:p>
@@ -2369,7 +2369,7 @@
           <a:p>
             <a:fld id="{FAE6055B-ABBD-4C0D-84D8-CCE0D097BF9D}" type="datetimeFigureOut">
               <a:rPr lang="en-US" smtClean="0"/>
-              <a:t>2022-11-24</a:t>
+              <a:t>2023-01-08</a:t>
             </a:fld>
             <a:endParaRPr lang="en-US"/>
           </a:p>
@@ -2657,7 +2657,7 @@
           <a:p>
             <a:fld id="{FAE6055B-ABBD-4C0D-84D8-CCE0D097BF9D}" type="datetimeFigureOut">
               <a:rPr lang="en-US" smtClean="0"/>
-              <a:t>2022-11-24</a:t>
+              <a:t>2023-01-08</a:t>
             </a:fld>
             <a:endParaRPr lang="en-US"/>
           </a:p>
@@ -2898,7 +2898,7 @@
           <a:p>
             <a:fld id="{FAE6055B-ABBD-4C0D-84D8-CCE0D097BF9D}" type="datetimeFigureOut">
               <a:rPr lang="en-US" smtClean="0"/>
-              <a:t>2022-11-24</a:t>
+              <a:t>2023-01-08</a:t>
             </a:fld>
             <a:endParaRPr lang="en-US"/>
           </a:p>
@@ -10045,12 +10045,13 @@
               <a:t>Decrypt and validate</a:t>
             </a:r>
             <a:br>
-              <a:rPr lang="en-US" sz="1600" dirty="0"/>
+              <a:rPr lang="en-US" sz="1600"/>
             </a:br>
             <a:r>
-              <a:rPr lang="en-US" sz="1600" dirty="0"/>
-              <a:t>authorization</a:t>
-            </a:r>
+              <a:rPr lang="en-US" sz="1600"/>
+              <a:t>user authorization</a:t>
+            </a:r>
+            <a:endParaRPr lang="en-US" sz="1600" dirty="0"/>
           </a:p>
         </p:txBody>
       </p:sp>
@@ -10947,8 +10948,8 @@
         </p:nvSpPr>
         <p:spPr>
           <a:xfrm>
-            <a:off x="1161352" y="6022104"/>
-            <a:ext cx="1982851" cy="300339"/>
+            <a:off x="956970" y="6022104"/>
+            <a:ext cx="2391617" cy="300339"/>
           </a:xfrm>
           <a:prstGeom prst="rect">
             <a:avLst/>
@@ -10977,7 +10978,7 @@
             </a:pPr>
             <a:r>
               <a:rPr lang="en-US" sz="1600" dirty="0"/>
-              <a:t>Encrypt authorization</a:t>
+              <a:t>Encrypt user authorization</a:t>
             </a:r>
           </a:p>
         </p:txBody>

</xml_diff>